<commit_message>
Weekly Preseentation & ReadMe Update
</commit_message>
<xml_diff>
--- a/Documentation/Bi-Weekly Reporting/Wk02 Presentation.pptx
+++ b/Documentation/Bi-Weekly Reporting/Wk02 Presentation.pptx
@@ -9,8 +9,8 @@
   </p:notesMasterIdLst>
   <p:sldIdLst>
     <p:sldId id="262" r:id="rId2"/>
-    <p:sldId id="263" r:id="rId3"/>
-    <p:sldId id="260" r:id="rId4"/>
+    <p:sldId id="266" r:id="rId3"/>
+    <p:sldId id="263" r:id="rId4"/>
     <p:sldId id="264" r:id="rId5"/>
   </p:sldIdLst>
   <p:sldSz cx="9144000" cy="6858000" type="screen4x3"/>
@@ -241,7 +241,7 @@
               <a:pPr>
                 <a:defRPr/>
               </a:pPr>
-              <a:t>05/11/2020</a:t>
+              <a:t>06/11/2020</a:t>
             </a:fld>
             <a:endParaRPr lang="en-GB"/>
           </a:p>
@@ -781,7 +781,7 @@
               <a:pPr>
                 <a:defRPr/>
               </a:pPr>
-              <a:t>05/11/2020</a:t>
+              <a:t>06/11/2020</a:t>
             </a:fld>
             <a:endParaRPr lang="en-GB"/>
           </a:p>
@@ -1087,7 +1087,7 @@
               <a:pPr>
                 <a:defRPr/>
               </a:pPr>
-              <a:t>05/11/2020</a:t>
+              <a:t>06/11/2020</a:t>
             </a:fld>
             <a:endParaRPr lang="en-GB"/>
           </a:p>
@@ -1366,7 +1366,7 @@
               <a:pPr>
                 <a:defRPr/>
               </a:pPr>
-              <a:t>05/11/2020</a:t>
+              <a:t>06/11/2020</a:t>
             </a:fld>
             <a:endParaRPr lang="en-GB"/>
           </a:p>
@@ -1941,7 +1941,7 @@
               <a:pPr>
                 <a:defRPr/>
               </a:pPr>
-              <a:t>05/11/2020</a:t>
+              <a:t>06/11/2020</a:t>
             </a:fld>
             <a:endParaRPr lang="en-GB"/>
           </a:p>
@@ -2215,7 +2215,7 @@
               <a:pPr>
                 <a:defRPr/>
               </a:pPr>
-              <a:t>05/11/2020</a:t>
+              <a:t>06/11/2020</a:t>
             </a:fld>
             <a:endParaRPr lang="en-GB"/>
           </a:p>
@@ -2806,7 +2806,7 @@
               <a:pPr>
                 <a:defRPr/>
               </a:pPr>
-              <a:t>05/11/2020</a:t>
+              <a:t>06/11/2020</a:t>
             </a:fld>
             <a:endParaRPr lang="en-GB"/>
           </a:p>
@@ -3153,7 +3153,7 @@
               <a:pPr>
                 <a:defRPr/>
               </a:pPr>
-              <a:t>05/11/2020</a:t>
+              <a:t>06/11/2020</a:t>
             </a:fld>
             <a:endParaRPr lang="en-GB"/>
           </a:p>
@@ -3343,7 +3343,7 @@
               <a:pPr>
                 <a:defRPr/>
               </a:pPr>
-              <a:t>05/11/2020</a:t>
+              <a:t>06/11/2020</a:t>
             </a:fld>
             <a:endParaRPr lang="en-GB"/>
           </a:p>
@@ -3538,7 +3538,7 @@
               <a:pPr>
                 <a:defRPr/>
               </a:pPr>
-              <a:t>05/11/2020</a:t>
+              <a:t>06/11/2020</a:t>
             </a:fld>
             <a:endParaRPr lang="en-GB"/>
           </a:p>
@@ -3723,7 +3723,7 @@
               <a:pPr>
                 <a:defRPr/>
               </a:pPr>
-              <a:t>05/11/2020</a:t>
+              <a:t>06/11/2020</a:t>
             </a:fld>
             <a:endParaRPr lang="en-GB"/>
           </a:p>
@@ -3997,7 +3997,7 @@
               <a:pPr>
                 <a:defRPr/>
               </a:pPr>
-              <a:t>05/11/2020</a:t>
+              <a:t>06/11/2020</a:t>
             </a:fld>
             <a:endParaRPr lang="en-GB"/>
           </a:p>
@@ -4304,7 +4304,7 @@
               <a:pPr>
                 <a:defRPr/>
               </a:pPr>
-              <a:t>05/11/2020</a:t>
+              <a:t>06/11/2020</a:t>
             </a:fld>
             <a:endParaRPr lang="en-GB"/>
           </a:p>
@@ -4749,7 +4749,7 @@
               <a:pPr>
                 <a:defRPr/>
               </a:pPr>
-              <a:t>05/11/2020</a:t>
+              <a:t>06/11/2020</a:t>
             </a:fld>
             <a:endParaRPr lang="en-GB"/>
           </a:p>
@@ -4888,7 +4888,7 @@
               <a:pPr>
                 <a:defRPr/>
               </a:pPr>
-              <a:t>05/11/2020</a:t>
+              <a:t>06/11/2020</a:t>
             </a:fld>
             <a:endParaRPr lang="en-GB"/>
           </a:p>
@@ -4998,7 +4998,7 @@
               <a:pPr>
                 <a:defRPr/>
               </a:pPr>
-              <a:t>05/11/2020</a:t>
+              <a:t>06/11/2020</a:t>
             </a:fld>
             <a:endParaRPr lang="en-GB"/>
           </a:p>
@@ -5296,7 +5296,7 @@
               <a:pPr>
                 <a:defRPr/>
               </a:pPr>
-              <a:t>05/11/2020</a:t>
+              <a:t>06/11/2020</a:t>
             </a:fld>
             <a:endParaRPr lang="en-GB"/>
           </a:p>
@@ -5602,7 +5602,7 @@
               <a:pPr>
                 <a:defRPr/>
               </a:pPr>
-              <a:t>05/11/2020</a:t>
+              <a:t>06/11/2020</a:t>
             </a:fld>
             <a:endParaRPr lang="en-GB"/>
           </a:p>
@@ -5848,7 +5848,7 @@
               <a:pPr>
                 <a:defRPr/>
               </a:pPr>
-              <a:t>05/11/2020</a:t>
+              <a:t>06/11/2020</a:t>
             </a:fld>
             <a:endParaRPr lang="en-GB"/>
           </a:p>
@@ -6631,7 +6631,7 @@
           <p:cNvPr id="2" name="Title 1">
             <a:extLst>
               <a:ext uri="{FF2B5EF4-FFF2-40B4-BE49-F238E27FC236}">
-                <a16:creationId xmlns:a16="http://schemas.microsoft.com/office/drawing/2014/main" xmlns="" id="{4E2A41F3-2A8E-4B07-AE4A-91D713EC07ED}"/>
+                <a16:creationId xmlns:a16="http://schemas.microsoft.com/office/drawing/2014/main" id="{4E2A41F3-2A8E-4B07-AE4A-91D713EC07ED}"/>
               </a:ext>
             </a:extLst>
           </p:cNvPr>
@@ -6642,18 +6642,35 @@
             <p:ph type="ctrTitle"/>
           </p:nvPr>
         </p:nvSpPr>
-        <p:spPr/>
+        <p:spPr>
+          <a:xfrm>
+            <a:off x="819314" y="2348879"/>
+            <a:ext cx="7510506" cy="1461121"/>
+          </a:xfrm>
+        </p:spPr>
         <p:txBody>
           <a:bodyPr>
-            <a:normAutofit/>
+            <a:normAutofit fontScale="90000"/>
           </a:bodyPr>
           <a:lstStyle/>
           <a:p>
-            <a:r>
-              <a:rPr lang="en-US" sz="3600" b="1" dirty="0" smtClean="0">
+            <a:pPr algn="l"/>
+            <a:r>
+              <a:rPr lang="en-US" sz="3600" b="1" dirty="0">
                 <a:latin typeface="Arial Nova" panose="020B0504020202020204" pitchFamily="34" charset="0"/>
               </a:rPr>
-              <a:t>Network configuration &amp; network management tool</a:t>
+              <a:t>Comp3000 Project:</a:t>
+            </a:r>
+            <a:br>
+              <a:rPr lang="en-US" sz="3600" b="1" dirty="0">
+                <a:latin typeface="Arial Nova" panose="020B0504020202020204" pitchFamily="34" charset="0"/>
+              </a:rPr>
+            </a:br>
+            <a:r>
+              <a:rPr lang="en-US" sz="3600" b="1" dirty="0">
+                <a:latin typeface="Arial Nova" panose="020B0504020202020204" pitchFamily="34" charset="0"/>
+              </a:rPr>
+              <a:t>Netmanager – NCM Application</a:t>
             </a:r>
             <a:endParaRPr lang="en-GB" sz="3600" b="1" dirty="0">
               <a:latin typeface="Arial Nova" panose="020B0504020202020204" pitchFamily="34" charset="0"/>
@@ -6663,30 +6680,38 @@
       </p:sp>
       <p:sp>
         <p:nvSpPr>
-          <p:cNvPr id="3" name="Subtitle 2">
+          <p:cNvPr id="4" name="TextBox 3">
             <a:extLst>
               <a:ext uri="{FF2B5EF4-FFF2-40B4-BE49-F238E27FC236}">
-                <a16:creationId xmlns:a16="http://schemas.microsoft.com/office/drawing/2014/main" xmlns="" id="{79CA7B3C-61FE-4E75-8A8C-26CBBA3B01D7}"/>
+                <a16:creationId xmlns:a16="http://schemas.microsoft.com/office/drawing/2014/main" id="{9D27B97E-C599-4764-825E-F5B2C940D4DC}"/>
               </a:ext>
             </a:extLst>
           </p:cNvPr>
-          <p:cNvSpPr>
-            <a:spLocks noGrp="1"/>
-          </p:cNvSpPr>
-          <p:nvPr>
-            <p:ph type="subTitle" idx="1"/>
-          </p:nvPr>
-        </p:nvSpPr>
-        <p:spPr/>
-        <p:txBody>
-          <a:bodyPr/>
+          <p:cNvSpPr txBox="1"/>
+          <p:nvPr/>
+        </p:nvSpPr>
+        <p:spPr>
+          <a:xfrm>
+            <a:off x="819314" y="3933056"/>
+            <a:ext cx="1448025" cy="369332"/>
+          </a:xfrm>
+          <a:prstGeom prst="rect">
+            <a:avLst/>
+          </a:prstGeom>
+          <a:noFill/>
+        </p:spPr>
+        <p:txBody>
+          <a:bodyPr wrap="none" rtlCol="0">
+            <a:spAutoFit/>
+          </a:bodyPr>
           <a:lstStyle/>
           <a:p>
             <a:r>
-              <a:rPr lang="en-GB" dirty="0" smtClean="0"/>
-              <a:t>Bi-Weekly Reporting</a:t>
-            </a:r>
-            <a:endParaRPr lang="en-GB" dirty="0"/>
+              <a:rPr lang="en-GB" dirty="0">
+                <a:latin typeface="Arial Nova Light" panose="020B0304020202020204" pitchFamily="34" charset="0"/>
+              </a:rPr>
+              <a:t>James White</a:t>
+            </a:r>
           </a:p>
         </p:txBody>
       </p:sp>
@@ -6722,190 +6747,123 @@
       </p:grpSpPr>
       <p:sp>
         <p:nvSpPr>
-          <p:cNvPr id="2" name="Title 1"/>
-          <p:cNvSpPr>
-            <a:spLocks noGrp="1"/>
-          </p:cNvSpPr>
-          <p:nvPr>
-            <p:ph type="title"/>
-          </p:nvPr>
-        </p:nvSpPr>
-        <p:spPr/>
-        <p:txBody>
-          <a:bodyPr>
-            <a:normAutofit/>
+          <p:cNvPr id="6" name="TextBox 5">
+            <a:extLst>
+              <a:ext uri="{FF2B5EF4-FFF2-40B4-BE49-F238E27FC236}">
+                <a16:creationId xmlns:a16="http://schemas.microsoft.com/office/drawing/2014/main" id="{7332E659-D3F4-47AB-95B2-721B9287881C}"/>
+              </a:ext>
+            </a:extLst>
+          </p:cNvPr>
+          <p:cNvSpPr txBox="1"/>
+          <p:nvPr/>
+        </p:nvSpPr>
+        <p:spPr>
+          <a:xfrm>
+            <a:off x="814397" y="692696"/>
+            <a:ext cx="2495298" cy="584775"/>
+          </a:xfrm>
+          <a:prstGeom prst="rect">
+            <a:avLst/>
+          </a:prstGeom>
+          <a:noFill/>
+        </p:spPr>
+        <p:txBody>
+          <a:bodyPr wrap="none" rtlCol="0">
+            <a:spAutoFit/>
           </a:bodyPr>
           <a:lstStyle/>
           <a:p>
             <a:r>
-              <a:rPr lang="en-US" sz="3200" b="1" dirty="0" smtClean="0">
-                <a:latin typeface="Arial" charset="0"/>
-                <a:ea typeface="Arial" charset="0"/>
-                <a:cs typeface="Arial" charset="0"/>
+              <a:rPr lang="en-GB" sz="3200" b="1" dirty="0">
+                <a:latin typeface="Arial Nova" panose="020B0504020202020204" pitchFamily="34" charset="0"/>
               </a:rPr>
-              <a:t>Current progress</a:t>
-            </a:r>
-            <a:endParaRPr lang="en-US" sz="3200" b="1" dirty="0">
-              <a:latin typeface="Arial" charset="0"/>
-              <a:ea typeface="Arial" charset="0"/>
-              <a:cs typeface="Arial" charset="0"/>
-            </a:endParaRPr>
-          </a:p>
-        </p:txBody>
-      </p:sp>
-      <p:sp>
-        <p:nvSpPr>
-          <p:cNvPr id="3" name="Content Placeholder 2"/>
-          <p:cNvSpPr>
-            <a:spLocks noGrp="1"/>
-          </p:cNvSpPr>
-          <p:nvPr>
-            <p:ph idx="1"/>
-          </p:nvPr>
+              <a:t>Project Idea</a:t>
+            </a:r>
+          </a:p>
+        </p:txBody>
+      </p:sp>
+      <p:sp>
+        <p:nvSpPr>
+          <p:cNvPr id="7" name="TextBox 6">
+            <a:extLst>
+              <a:ext uri="{FF2B5EF4-FFF2-40B4-BE49-F238E27FC236}">
+                <a16:creationId xmlns:a16="http://schemas.microsoft.com/office/drawing/2014/main" id="{82A93FF0-9D9D-4214-B1BC-8C1B1FFF7970}"/>
+              </a:ext>
+            </a:extLst>
+          </p:cNvPr>
+          <p:cNvSpPr txBox="1"/>
+          <p:nvPr/>
         </p:nvSpPr>
         <p:spPr>
           <a:xfrm>
-            <a:off x="818348" y="2060898"/>
-            <a:ext cx="7511472" cy="4392438"/>
+            <a:off x="814396" y="1628800"/>
+            <a:ext cx="7718043" cy="2862322"/>
           </a:xfrm>
+          <a:prstGeom prst="rect">
+            <a:avLst/>
+          </a:prstGeom>
+          <a:noFill/>
         </p:spPr>
         <p:txBody>
-          <a:bodyPr>
-            <a:noAutofit/>
+          <a:bodyPr wrap="square" rtlCol="0">
+            <a:spAutoFit/>
           </a:bodyPr>
           <a:lstStyle/>
           <a:p>
-            <a:r>
-              <a:rPr lang="en-US" sz="2000" dirty="0" smtClean="0">
-                <a:latin typeface="Arial" charset="0"/>
-                <a:ea typeface="Arial" charset="0"/>
-                <a:cs typeface="Arial" charset="0"/>
+            <a:pPr marL="285750" indent="-285750">
+              <a:buFont typeface="Arial" panose="020B0604020202020204" pitchFamily="34" charset="0"/>
+              <a:buChar char="•"/>
+            </a:pPr>
+            <a:r>
+              <a:rPr lang="en-US" sz="2000" dirty="0">
+                <a:latin typeface="Arial Nova Light" panose="020B0304020202020204" pitchFamily="34" charset="0"/>
               </a:rPr>
-              <a:t>Pre-development testing</a:t>
-            </a:r>
-          </a:p>
-          <a:p>
-            <a:pPr lvl="1"/>
-            <a:r>
-              <a:rPr lang="en-US" sz="1800" dirty="0" err="1" smtClean="0">
-                <a:latin typeface="Arial" charset="0"/>
-                <a:ea typeface="Arial" charset="0"/>
-                <a:cs typeface="Arial" charset="0"/>
+              <a:t>Network Configuration &amp; Management Application for automated configuration, management and monitoring of a network </a:t>
+            </a:r>
+          </a:p>
+          <a:p>
+            <a:pPr marL="285750" indent="-285750">
+              <a:buFont typeface="Arial" panose="020B0604020202020204" pitchFamily="34" charset="0"/>
+              <a:buChar char="•"/>
+            </a:pPr>
+            <a:endParaRPr lang="en-US" sz="2000" dirty="0">
+              <a:latin typeface="Arial Nova Light" panose="020B0304020202020204" pitchFamily="34" charset="0"/>
+            </a:endParaRPr>
+          </a:p>
+          <a:p>
+            <a:pPr marL="285750" indent="-285750">
+              <a:buFont typeface="Arial" panose="020B0604020202020204" pitchFamily="34" charset="0"/>
+              <a:buChar char="•"/>
+            </a:pPr>
+            <a:r>
+              <a:rPr lang="en-US" sz="2000" dirty="0">
+                <a:latin typeface="Arial Nova Light" panose="020B0304020202020204" pitchFamily="34" charset="0"/>
               </a:rPr>
-              <a:t>Netmiko</a:t>
-            </a:r>
-            <a:r>
-              <a:rPr lang="en-US" sz="1800" dirty="0" smtClean="0">
-                <a:latin typeface="Arial" charset="0"/>
-                <a:ea typeface="Arial" charset="0"/>
-                <a:cs typeface="Arial" charset="0"/>
+              <a:t>Includes additional security automation for implementing network security features (e.g. access lists, port security etc.) based on set security polices</a:t>
+            </a:r>
+          </a:p>
+          <a:p>
+            <a:pPr marL="285750" indent="-285750">
+              <a:buFont typeface="Arial" panose="020B0604020202020204" pitchFamily="34" charset="0"/>
+              <a:buChar char="•"/>
+            </a:pPr>
+            <a:endParaRPr lang="en-US" sz="2000" dirty="0">
+              <a:latin typeface="Arial Nova Light" panose="020B0304020202020204" pitchFamily="34" charset="0"/>
+            </a:endParaRPr>
+          </a:p>
+          <a:p>
+            <a:pPr marL="285750" indent="-285750">
+              <a:buFont typeface="Arial" panose="020B0604020202020204" pitchFamily="34" charset="0"/>
+              <a:buChar char="•"/>
+            </a:pPr>
+            <a:r>
+              <a:rPr lang="en-US" sz="2000" dirty="0">
+                <a:latin typeface="Arial Nova Light" panose="020B0304020202020204" pitchFamily="34" charset="0"/>
               </a:rPr>
-              <a:t> SSH scripts</a:t>
-            </a:r>
-          </a:p>
-          <a:p>
-            <a:pPr lvl="1"/>
-            <a:r>
-              <a:rPr lang="en-US" sz="1800" dirty="0" smtClean="0">
-                <a:latin typeface="Arial" charset="0"/>
-                <a:ea typeface="Arial" charset="0"/>
-                <a:cs typeface="Arial" charset="0"/>
-              </a:rPr>
-              <a:t>NAPALM</a:t>
-            </a:r>
-          </a:p>
-          <a:p>
-            <a:r>
-              <a:rPr lang="en-US" sz="2000" dirty="0" smtClean="0">
-                <a:latin typeface="Arial" charset="0"/>
-                <a:ea typeface="Arial" charset="0"/>
-                <a:cs typeface="Arial" charset="0"/>
-              </a:rPr>
-              <a:t>User Functionality, User story &amp; User Flow</a:t>
-            </a:r>
-            <a:endParaRPr lang="en-US" sz="1600" dirty="0" smtClean="0">
-              <a:latin typeface="Arial" charset="0"/>
-              <a:ea typeface="Arial" charset="0"/>
-              <a:cs typeface="Arial" charset="0"/>
-            </a:endParaRPr>
-          </a:p>
-          <a:p>
-            <a:r>
-              <a:rPr lang="en-US" sz="2000" dirty="0" smtClean="0">
-                <a:latin typeface="Arial" charset="0"/>
-                <a:ea typeface="Arial" charset="0"/>
-                <a:cs typeface="Arial" charset="0"/>
-              </a:rPr>
-              <a:t>Started building the backend</a:t>
-            </a:r>
-          </a:p>
-          <a:p>
-            <a:pPr lvl="1"/>
-            <a:r>
-              <a:rPr lang="en-US" sz="1800" dirty="0" smtClean="0">
-                <a:latin typeface="Arial" charset="0"/>
-                <a:ea typeface="Arial" charset="0"/>
-                <a:cs typeface="Arial" charset="0"/>
-              </a:rPr>
-              <a:t>Ubuntu server with:</a:t>
-            </a:r>
-          </a:p>
-          <a:p>
-            <a:pPr lvl="1"/>
-            <a:r>
-              <a:rPr lang="en-US" sz="1800" dirty="0" smtClean="0">
-                <a:latin typeface="Arial" charset="0"/>
-                <a:ea typeface="Arial" charset="0"/>
-                <a:cs typeface="Arial" charset="0"/>
-              </a:rPr>
-              <a:t>GNS3 Remote Server</a:t>
-            </a:r>
-          </a:p>
-          <a:p>
-            <a:pPr lvl="1"/>
-            <a:r>
-              <a:rPr lang="en-US" sz="1800" dirty="0" smtClean="0">
-                <a:latin typeface="Arial" charset="0"/>
-                <a:ea typeface="Arial" charset="0"/>
-                <a:cs typeface="Arial" charset="0"/>
-              </a:rPr>
-              <a:t>Django Web Server</a:t>
-            </a:r>
-          </a:p>
-          <a:p>
-            <a:r>
-              <a:rPr lang="en-US" sz="2000" dirty="0" smtClean="0">
-                <a:latin typeface="Arial" charset="0"/>
-                <a:ea typeface="Arial" charset="0"/>
-                <a:cs typeface="Arial" charset="0"/>
-              </a:rPr>
-              <a:t>Setup development environment</a:t>
-            </a:r>
-          </a:p>
-          <a:p>
-            <a:pPr lvl="1"/>
-            <a:r>
-              <a:rPr lang="en-US" sz="1800" dirty="0" err="1" smtClean="0">
-                <a:latin typeface="Arial" charset="0"/>
-                <a:ea typeface="Arial" charset="0"/>
-                <a:cs typeface="Arial" charset="0"/>
-              </a:rPr>
-              <a:t>Pycharm</a:t>
-            </a:r>
-            <a:r>
-              <a:rPr lang="en-US" sz="1800" dirty="0" smtClean="0">
-                <a:latin typeface="Arial" charset="0"/>
-                <a:ea typeface="Arial" charset="0"/>
-                <a:cs typeface="Arial" charset="0"/>
-              </a:rPr>
-              <a:t> – Currently running in a virtual environment</a:t>
-            </a:r>
-          </a:p>
-          <a:p>
-            <a:endParaRPr lang="en-US" sz="1600" dirty="0">
-              <a:latin typeface="Arial" charset="0"/>
-              <a:ea typeface="Arial" charset="0"/>
-              <a:cs typeface="Arial" charset="0"/>
+              <a:t>User will be able to log in to view and manage the network through the GUI avoiding direct access to network devices</a:t>
+            </a:r>
+            <a:endParaRPr lang="en-GB" sz="2400" dirty="0">
+              <a:latin typeface="Arial Nova Light" panose="020B0304020202020204" pitchFamily="34" charset="0"/>
             </a:endParaRPr>
           </a:p>
         </p:txBody>
@@ -6913,7 +6871,7 @@
     </p:spTree>
     <p:extLst>
       <p:ext uri="{BB962C8B-B14F-4D97-AF65-F5344CB8AC3E}">
-        <p14:creationId xmlns:p14="http://schemas.microsoft.com/office/powerpoint/2010/main" val="2107930471"/>
+        <p14:creationId xmlns:p14="http://schemas.microsoft.com/office/powerpoint/2010/main" val="895328349"/>
       </p:ext>
     </p:extLst>
   </p:cSld>
@@ -6965,10 +6923,10 @@
       </p:grpSpPr>
       <p:pic>
         <p:nvPicPr>
-          <p:cNvPr id="36" name="Picture 35">
+          <p:cNvPr id="4" name="Picture 3" descr="Graphical user interface, diagram&#10;&#10;Description automatically generated">
             <a:extLst>
               <a:ext uri="{FF2B5EF4-FFF2-40B4-BE49-F238E27FC236}">
-                <a16:creationId xmlns:a16="http://schemas.microsoft.com/office/drawing/2014/main" xmlns="" id="{EDCA9B99-DA26-469F-B091-E3B79D9BD31A}"/>
+                <a16:creationId xmlns:a16="http://schemas.microsoft.com/office/drawing/2014/main" id="{96610086-3F6C-4CD4-B110-4FC0BFD53665}"/>
               </a:ext>
             </a:extLst>
           </p:cNvPr>
@@ -6978,15 +6936,21 @@
           <p:nvPr/>
         </p:nvPicPr>
         <p:blipFill>
-          <a:blip r:embed="rId3"/>
+          <a:blip r:embed="rId3" cstate="print">
+            <a:extLst>
+              <a:ext uri="{28A0092B-C50C-407E-A947-70E740481C1C}">
+                <a14:useLocalDpi xmlns:a14="http://schemas.microsoft.com/office/drawing/2010/main" val="0"/>
+              </a:ext>
+            </a:extLst>
+          </a:blip>
           <a:stretch>
             <a:fillRect/>
           </a:stretch>
         </p:blipFill>
         <p:spPr>
           <a:xfrm>
-            <a:off x="377736" y="980728"/>
-            <a:ext cx="8388527" cy="5599342"/>
+            <a:off x="4427984" y="1916832"/>
+            <a:ext cx="4530841" cy="3024336"/>
           </a:xfrm>
           <a:prstGeom prst="roundRect">
             <a:avLst>
@@ -7020,10 +6984,10 @@
       </p:pic>
       <p:sp>
         <p:nvSpPr>
-          <p:cNvPr id="37" name="TextBox 36">
+          <p:cNvPr id="8" name="TextBox 7">
             <a:extLst>
               <a:ext uri="{FF2B5EF4-FFF2-40B4-BE49-F238E27FC236}">
-                <a16:creationId xmlns:a16="http://schemas.microsoft.com/office/drawing/2014/main" xmlns="" id="{E0B19CDE-D27C-45F7-B5E1-B6B8D0AC8688}"/>
+                <a16:creationId xmlns:a16="http://schemas.microsoft.com/office/drawing/2014/main" id="{3CD96FA1-12FB-4EEE-A30C-6C63508D7F7C}"/>
               </a:ext>
             </a:extLst>
           </p:cNvPr>
@@ -7032,8 +6996,8 @@
         </p:nvSpPr>
         <p:spPr>
           <a:xfrm>
-            <a:off x="0" y="188640"/>
-            <a:ext cx="9144000" cy="584775"/>
+            <a:off x="611560" y="1639888"/>
+            <a:ext cx="3731779" cy="3447098"/>
           </a:xfrm>
           <a:prstGeom prst="rect">
             <a:avLst/>
@@ -7046,23 +7010,173 @@
           </a:bodyPr>
           <a:lstStyle/>
           <a:p>
-            <a:pPr algn="ctr"/>
-            <a:r>
-              <a:rPr lang="en-US" sz="3200" b="1" dirty="0">
+            <a:pPr marL="342900" indent="-342900">
+              <a:buFont typeface="Arial" panose="020B0604020202020204" pitchFamily="34" charset="0"/>
+              <a:buChar char="•"/>
+            </a:pPr>
+            <a:r>
+              <a:rPr lang="en-US" sz="2400" b="1" dirty="0">
+                <a:latin typeface="Arial Nova Light" panose="020B0304020202020204" pitchFamily="34" charset="0"/>
+                <a:ea typeface="Arial" charset="0"/>
+                <a:cs typeface="Arial" charset="0"/>
+              </a:rPr>
+              <a:t>Pre-development testing</a:t>
+            </a:r>
+          </a:p>
+          <a:p>
+            <a:pPr marL="800100" lvl="1" indent="-342900">
+              <a:buFont typeface="Arial" panose="020B0604020202020204" pitchFamily="34" charset="0"/>
+              <a:buChar char="•"/>
+            </a:pPr>
+            <a:r>
+              <a:rPr lang="en-US" dirty="0" err="1">
+                <a:latin typeface="Arial Nova Light" panose="020B0304020202020204" pitchFamily="34" charset="0"/>
+                <a:ea typeface="Arial" charset="0"/>
+                <a:cs typeface="Arial" charset="0"/>
+              </a:rPr>
+              <a:t>Netmiko</a:t>
+            </a:r>
+            <a:r>
+              <a:rPr lang="en-US" dirty="0">
+                <a:latin typeface="Arial Nova Light" panose="020B0304020202020204" pitchFamily="34" charset="0"/>
+                <a:ea typeface="Arial" charset="0"/>
+                <a:cs typeface="Arial" charset="0"/>
+              </a:rPr>
+              <a:t> SSH scripts</a:t>
+            </a:r>
+          </a:p>
+          <a:p>
+            <a:pPr marL="800100" lvl="1" indent="-342900">
+              <a:buFont typeface="Arial" panose="020B0604020202020204" pitchFamily="34" charset="0"/>
+              <a:buChar char="•"/>
+            </a:pPr>
+            <a:r>
+              <a:rPr lang="en-US" dirty="0">
+                <a:latin typeface="Arial Nova Light" panose="020B0304020202020204" pitchFamily="34" charset="0"/>
+                <a:ea typeface="Arial" charset="0"/>
+                <a:cs typeface="Arial" charset="0"/>
+              </a:rPr>
+              <a:t>NAPALM – Python automation package</a:t>
+            </a:r>
+          </a:p>
+          <a:p>
+            <a:pPr marL="342900" indent="-342900">
+              <a:buFont typeface="Arial" panose="020B0604020202020204" pitchFamily="34" charset="0"/>
+              <a:buChar char="•"/>
+            </a:pPr>
+            <a:r>
+              <a:rPr lang="en-US" sz="2400" b="1" dirty="0">
+                <a:latin typeface="Arial Nova Light" panose="020B0304020202020204" pitchFamily="34" charset="0"/>
+                <a:ea typeface="Arial" charset="0"/>
+                <a:cs typeface="Arial" charset="0"/>
+              </a:rPr>
+              <a:t>User Functionality</a:t>
+            </a:r>
+          </a:p>
+          <a:p>
+            <a:pPr marL="342900" indent="-342900">
+              <a:buFont typeface="Arial" panose="020B0604020202020204" pitchFamily="34" charset="0"/>
+              <a:buChar char="•"/>
+            </a:pPr>
+            <a:r>
+              <a:rPr lang="en-US" sz="2400" b="1" dirty="0">
+                <a:latin typeface="Arial Nova Light" panose="020B0304020202020204" pitchFamily="34" charset="0"/>
+                <a:ea typeface="Arial" charset="0"/>
+                <a:cs typeface="Arial" charset="0"/>
+              </a:rPr>
+              <a:t>Backend development</a:t>
+            </a:r>
+          </a:p>
+          <a:p>
+            <a:pPr marL="800100" lvl="1" indent="-342900">
+              <a:buFont typeface="Arial" panose="020B0604020202020204" pitchFamily="34" charset="0"/>
+              <a:buChar char="•"/>
+            </a:pPr>
+            <a:r>
+              <a:rPr lang="en-US" dirty="0">
+                <a:latin typeface="Arial Nova Light" panose="020B0304020202020204" pitchFamily="34" charset="0"/>
+                <a:ea typeface="Arial" charset="0"/>
+                <a:cs typeface="Arial" charset="0"/>
+              </a:rPr>
+              <a:t>Ubuntu server with:</a:t>
+            </a:r>
+          </a:p>
+          <a:p>
+            <a:pPr marL="1257300" lvl="2" indent="-342900">
+              <a:buFont typeface="Arial" panose="020B0604020202020204" pitchFamily="34" charset="0"/>
+              <a:buChar char="•"/>
+            </a:pPr>
+            <a:r>
+              <a:rPr lang="en-US" dirty="0">
+                <a:latin typeface="Arial Nova Light" panose="020B0304020202020204" pitchFamily="34" charset="0"/>
+                <a:ea typeface="Arial" charset="0"/>
+                <a:cs typeface="Arial" charset="0"/>
+              </a:rPr>
+              <a:t>GNS3 Remote Server Django/</a:t>
+            </a:r>
+            <a:r>
+              <a:rPr lang="en-US" dirty="0" err="1">
+                <a:latin typeface="Arial Nova Light" panose="020B0304020202020204" pitchFamily="34" charset="0"/>
+                <a:ea typeface="Arial" charset="0"/>
+                <a:cs typeface="Arial" charset="0"/>
+              </a:rPr>
+              <a:t>Gunicorn</a:t>
+            </a:r>
+            <a:r>
+              <a:rPr lang="en-US" dirty="0">
+                <a:latin typeface="Arial Nova Light" panose="020B0304020202020204" pitchFamily="34" charset="0"/>
+                <a:ea typeface="Arial" charset="0"/>
+                <a:cs typeface="Arial" charset="0"/>
+              </a:rPr>
+              <a:t> Web Server</a:t>
+            </a:r>
+          </a:p>
+          <a:p>
+            <a:endParaRPr lang="en-GB" sz="2000" dirty="0"/>
+          </a:p>
+        </p:txBody>
+      </p:sp>
+      <p:sp>
+        <p:nvSpPr>
+          <p:cNvPr id="9" name="TextBox 8">
+            <a:extLst>
+              <a:ext uri="{FF2B5EF4-FFF2-40B4-BE49-F238E27FC236}">
+                <a16:creationId xmlns:a16="http://schemas.microsoft.com/office/drawing/2014/main" id="{3258AFE6-1685-453B-8CCF-C06731535E79}"/>
+              </a:ext>
+            </a:extLst>
+          </p:cNvPr>
+          <p:cNvSpPr txBox="1"/>
+          <p:nvPr/>
+        </p:nvSpPr>
+        <p:spPr>
+          <a:xfrm>
+            <a:off x="715011" y="692696"/>
+            <a:ext cx="3524876" cy="584775"/>
+          </a:xfrm>
+          <a:prstGeom prst="rect">
+            <a:avLst/>
+          </a:prstGeom>
+          <a:noFill/>
+        </p:spPr>
+        <p:txBody>
+          <a:bodyPr wrap="none" rtlCol="0">
+            <a:spAutoFit/>
+          </a:bodyPr>
+          <a:lstStyle/>
+          <a:p>
+            <a:r>
+              <a:rPr lang="en-GB" sz="3200" b="1" dirty="0">
                 <a:latin typeface="Arial Nova" panose="020B0504020202020204" pitchFamily="34" charset="0"/>
               </a:rPr>
-              <a:t>User Flow/Storyboard</a:t>
-            </a:r>
-            <a:endParaRPr lang="en-GB" sz="3200" b="1" dirty="0">
-              <a:latin typeface="Arial Nova" panose="020B0504020202020204" pitchFamily="34" charset="0"/>
-            </a:endParaRPr>
+              <a:t>Current Progress</a:t>
+            </a:r>
           </a:p>
         </p:txBody>
       </p:sp>
     </p:spTree>
     <p:extLst>
       <p:ext uri="{BB962C8B-B14F-4D97-AF65-F5344CB8AC3E}">
-        <p14:creationId xmlns:p14="http://schemas.microsoft.com/office/powerpoint/2010/main" val="4274705361"/>
+        <p14:creationId xmlns:p14="http://schemas.microsoft.com/office/powerpoint/2010/main" val="2107930471"/>
       </p:ext>
     </p:extLst>
   </p:cSld>
@@ -7091,37 +7205,109 @@
       </p:grpSpPr>
       <p:sp>
         <p:nvSpPr>
-          <p:cNvPr id="3" name="Content Placeholder 2"/>
-          <p:cNvSpPr>
-            <a:spLocks noGrp="1"/>
-          </p:cNvSpPr>
-          <p:nvPr>
-            <p:ph idx="1"/>
-          </p:nvPr>
+          <p:cNvPr id="6" name="TextBox 5">
+            <a:extLst>
+              <a:ext uri="{FF2B5EF4-FFF2-40B4-BE49-F238E27FC236}">
+                <a16:creationId xmlns:a16="http://schemas.microsoft.com/office/drawing/2014/main" id="{EAB38E5E-B365-4C01-87FF-E391A3EBE169}"/>
+              </a:ext>
+            </a:extLst>
+          </p:cNvPr>
+          <p:cNvSpPr txBox="1"/>
+          <p:nvPr/>
         </p:nvSpPr>
         <p:spPr>
           <a:xfrm>
-            <a:off x="818347" y="1908498"/>
-            <a:ext cx="7511472" cy="2024988"/>
+            <a:off x="818347" y="908720"/>
+            <a:ext cx="2380203" cy="584775"/>
           </a:xfrm>
+          <a:prstGeom prst="rect">
+            <a:avLst/>
+          </a:prstGeom>
+          <a:noFill/>
         </p:spPr>
         <p:txBody>
-          <a:bodyPr/>
+          <a:bodyPr wrap="none" rtlCol="0">
+            <a:spAutoFit/>
+          </a:bodyPr>
           <a:lstStyle/>
           <a:p>
             <a:r>
-              <a:rPr lang="en-US" dirty="0">
-                <a:latin typeface="Arial" charset="0"/>
+              <a:rPr lang="en-US" sz="3200" b="1" dirty="0">
+                <a:latin typeface="Arial Nova" panose="020B0504020202020204" pitchFamily="34" charset="0"/>
                 <a:ea typeface="Arial" charset="0"/>
                 <a:cs typeface="Arial" charset="0"/>
               </a:rPr>
-              <a:t>Finish building the backend</a:t>
-            </a:r>
-          </a:p>
-          <a:p>
-            <a:r>
-              <a:rPr lang="en-US" dirty="0">
-                <a:latin typeface="Arial" charset="0"/>
+              <a:t>Next Sprint</a:t>
+            </a:r>
+            <a:endParaRPr lang="en-GB" sz="3200" b="1" dirty="0">
+              <a:latin typeface="Arial Nova" panose="020B0504020202020204" pitchFamily="34" charset="0"/>
+            </a:endParaRPr>
+          </a:p>
+        </p:txBody>
+      </p:sp>
+      <p:sp>
+        <p:nvSpPr>
+          <p:cNvPr id="7" name="TextBox 6">
+            <a:extLst>
+              <a:ext uri="{FF2B5EF4-FFF2-40B4-BE49-F238E27FC236}">
+                <a16:creationId xmlns:a16="http://schemas.microsoft.com/office/drawing/2014/main" id="{48F4A056-2F15-43E5-9871-10BC9F8CD229}"/>
+              </a:ext>
+            </a:extLst>
+          </p:cNvPr>
+          <p:cNvSpPr txBox="1"/>
+          <p:nvPr/>
+        </p:nvSpPr>
+        <p:spPr>
+          <a:xfrm>
+            <a:off x="831173" y="1844824"/>
+            <a:ext cx="4495974" cy="1846659"/>
+          </a:xfrm>
+          <a:prstGeom prst="rect">
+            <a:avLst/>
+          </a:prstGeom>
+          <a:noFill/>
+        </p:spPr>
+        <p:txBody>
+          <a:bodyPr wrap="none" rtlCol="0">
+            <a:spAutoFit/>
+          </a:bodyPr>
+          <a:lstStyle/>
+          <a:p>
+            <a:pPr marL="342900" indent="-342900">
+              <a:buFont typeface="Arial" panose="020B0604020202020204" pitchFamily="34" charset="0"/>
+              <a:buChar char="•"/>
+            </a:pPr>
+            <a:r>
+              <a:rPr lang="en-US" sz="2400" dirty="0">
+                <a:latin typeface="Arial Nova Light" panose="020B0304020202020204" pitchFamily="34" charset="0"/>
+                <a:ea typeface="Arial" charset="0"/>
+                <a:cs typeface="Arial" charset="0"/>
+              </a:rPr>
+              <a:t>Finish developing the backend</a:t>
+            </a:r>
+          </a:p>
+          <a:p>
+            <a:pPr marL="342900" indent="-342900">
+              <a:buFont typeface="Arial" panose="020B0604020202020204" pitchFamily="34" charset="0"/>
+              <a:buChar char="•"/>
+            </a:pPr>
+            <a:r>
+              <a:rPr lang="en-US" sz="2400" dirty="0">
+                <a:latin typeface="Arial Nova Light" panose="020B0304020202020204" pitchFamily="34" charset="0"/>
+                <a:ea typeface="Arial" charset="0"/>
+                <a:cs typeface="Arial" charset="0"/>
+              </a:rPr>
+              <a:t>GUI Design</a:t>
+            </a:r>
+          </a:p>
+          <a:p>
+            <a:pPr marL="342900" indent="-342900">
+              <a:buFont typeface="Arial" panose="020B0604020202020204" pitchFamily="34" charset="0"/>
+              <a:buChar char="•"/>
+            </a:pPr>
+            <a:r>
+              <a:rPr lang="en-US" sz="2400" dirty="0">
+                <a:latin typeface="Arial Nova Light" panose="020B0304020202020204" pitchFamily="34" charset="0"/>
                 <a:ea typeface="Arial" charset="0"/>
                 <a:cs typeface="Arial" charset="0"/>
               </a:rPr>
@@ -7129,58 +7315,21 @@
             </a:r>
           </a:p>
           <a:p>
-            <a:r>
-              <a:rPr lang="en-US" dirty="0" smtClean="0">
-                <a:latin typeface="Arial" charset="0"/>
+            <a:pPr marL="342900" indent="-342900">
+              <a:buFont typeface="Arial" panose="020B0604020202020204" pitchFamily="34" charset="0"/>
+              <a:buChar char="•"/>
+            </a:pPr>
+            <a:r>
+              <a:rPr lang="en-US" sz="2400" dirty="0">
+                <a:latin typeface="Arial Nova Light" panose="020B0304020202020204" pitchFamily="34" charset="0"/>
                 <a:ea typeface="Arial" charset="0"/>
                 <a:cs typeface="Arial" charset="0"/>
               </a:rPr>
-              <a:t>Finish the </a:t>
-            </a:r>
-            <a:r>
-              <a:rPr lang="en-US" dirty="0">
-                <a:latin typeface="Arial" charset="0"/>
-                <a:ea typeface="Arial" charset="0"/>
-                <a:cs typeface="Arial" charset="0"/>
-              </a:rPr>
-              <a:t>python network scripts</a:t>
-            </a:r>
-          </a:p>
-          <a:p>
-            <a:endParaRPr lang="en-US" dirty="0"/>
-          </a:p>
-        </p:txBody>
-      </p:sp>
-      <p:sp>
-        <p:nvSpPr>
-          <p:cNvPr id="4" name="Title 1"/>
-          <p:cNvSpPr>
-            <a:spLocks noGrp="1"/>
-          </p:cNvSpPr>
-          <p:nvPr>
-            <p:ph type="title"/>
-          </p:nvPr>
-        </p:nvSpPr>
-        <p:spPr/>
-        <p:txBody>
-          <a:bodyPr>
-            <a:normAutofit/>
-          </a:bodyPr>
-          <a:lstStyle/>
-          <a:p>
-            <a:r>
-              <a:rPr lang="en-US" sz="3200" dirty="0" smtClean="0">
-                <a:latin typeface="Arial" charset="0"/>
-                <a:ea typeface="Arial" charset="0"/>
-                <a:cs typeface="Arial" charset="0"/>
-              </a:rPr>
-              <a:t>Next sprint</a:t>
-            </a:r>
-            <a:endParaRPr lang="en-US" sz="3200" dirty="0">
-              <a:latin typeface="Arial" charset="0"/>
-              <a:ea typeface="Arial" charset="0"/>
-              <a:cs typeface="Arial" charset="0"/>
-            </a:endParaRPr>
+              <a:t>Python network scripts</a:t>
+            </a:r>
+          </a:p>
+          <a:p>
+            <a:endParaRPr lang="en-GB" dirty="0"/>
           </a:p>
         </p:txBody>
       </p:sp>

</xml_diff>